<commit_message>
Oefeningen 17 18 abstract class
</commit_message>
<xml_diff>
--- a/Stage/WPL3_INTERVISIE_2021_pitch_BOELEN_Evi.pptx
+++ b/Stage/WPL3_INTERVISIE_2021_pitch_BOELEN_Evi.pptx
@@ -206,7 +206,7 @@
             <a:fld id="{70DE778B-9043-6640-BE32-D65768C6815F}" type="datetimeFigureOut">
               <a:rPr lang="nl-NL" smtClean="0"/>
               <a:pPr/>
-              <a:t>19-11-2021</a:t>
+              <a:t>13-3-2022</a:t>
             </a:fld>
             <a:endParaRPr lang="nl-NL" dirty="0"/>
           </a:p>
@@ -752,54 +752,7 @@
             </a:r>
             <a:r>
               <a:rPr lang="nl-NL" dirty="0"/>
-              <a:t> monsters. Deze met allemaal verschillende manieren om jou van de trein af te krijgen. In dit spel is het aan jou om de vijanden uit te schakelen en te overwinnen. </a:t>
-            </a:r>
-          </a:p>
-          <a:p>
-            <a:r>
-              <a:rPr lang="nl-NL" dirty="0"/>
-              <a:t>Ik ken mijn volledige opdracht nog niet omdat ik vorige week nog thuis zat. Maar telefonisch is me medegedeeld dat ik samen met mijn leercoach zal werken aan de </a:t>
-            </a:r>
-            <a:r>
-              <a:rPr lang="nl-NL" dirty="0" err="1"/>
-              <a:t>enemy</a:t>
-            </a:r>
-            <a:r>
-              <a:rPr lang="nl-NL" dirty="0"/>
-              <a:t> AI. Ik zal dus samen met Jeroen Put voor de gedragingen van de vijanden zorgen. Zodat het geen gewone “rijd en schiet”, maar echte slimme vijanden worden, die van je gedrag leren en zich daaraan aanpassen. </a:t>
-            </a:r>
-          </a:p>
-          <a:p>
-            <a:endParaRPr lang="nl-NL" dirty="0"/>
-          </a:p>
-          <a:p>
-            <a:r>
-              <a:rPr lang="nl-NL" dirty="0"/>
-              <a:t>Er werd me ook gevraagd om onderzoek te doen naar het concept </a:t>
-            </a:r>
-            <a:r>
-              <a:rPr lang="nl-NL" dirty="0" err="1"/>
-              <a:t>mirror</a:t>
-            </a:r>
-            <a:r>
-              <a:rPr lang="nl-NL" dirty="0"/>
-              <a:t> </a:t>
-            </a:r>
-            <a:r>
-              <a:rPr lang="nl-NL" dirty="0" err="1"/>
-              <a:t>networking</a:t>
-            </a:r>
-            <a:r>
-              <a:rPr lang="nl-NL" dirty="0"/>
-              <a:t>. Dit is een API die heel de </a:t>
-            </a:r>
-            <a:r>
-              <a:rPr lang="nl-NL" dirty="0" err="1"/>
-              <a:t>networking</a:t>
-            </a:r>
-            <a:r>
-              <a:rPr lang="nl-NL" dirty="0"/>
-              <a:t> in je game zal administreren. En dus het mogelijk maakt om met verschillende mensen in een spel te spelen. Verder weet ik hier nog niet zo veel over.</a:t>
+              <a:t> monsters. Deze met allemaal verschillende manieren om jou neer te schieten.</a:t>
             </a:r>
           </a:p>
         </p:txBody>
@@ -885,78 +838,7 @@
           <a:bodyPr/>
           <a:lstStyle/>
           <a:p>
-            <a:r>
-              <a:rPr lang="nl-NL" dirty="0"/>
-              <a:t>Ik kijk erg uit naar het ontwikkelen in VR. Dit is een leuke ervaring, ik heb dit nog al eens gedaan. </a:t>
-            </a:r>
-          </a:p>
-          <a:p>
-            <a:r>
-              <a:rPr lang="nl-NL" dirty="0"/>
-              <a:t>Een AI schrijven lijkt me ook echt een leerrijke ervaring. Dit is mijn eerste echte contact met het schrijven van een basic </a:t>
-            </a:r>
-            <a:r>
-              <a:rPr lang="nl-NL" dirty="0" err="1"/>
-              <a:t>Artificial</a:t>
-            </a:r>
-            <a:r>
-              <a:rPr lang="nl-NL" dirty="0"/>
-              <a:t> </a:t>
-            </a:r>
-            <a:r>
-              <a:rPr lang="nl-NL" dirty="0" err="1"/>
-              <a:t>Inteligence</a:t>
-            </a:r>
-            <a:r>
-              <a:rPr lang="nl-NL" dirty="0"/>
-              <a:t>. Verder weet ik dat ik enorm veel zal bijleren van mijn collega’s. Niet enkel op development vlak, maar ook op vlak van teamwork, communicatie, en andere vaardigheden. </a:t>
-            </a:r>
-          </a:p>
-          <a:p>
-            <a:r>
-              <a:rPr lang="nl-NL" dirty="0"/>
-              <a:t>Het grootste van al kijk ik uit naar het mee ontwikkelen van een echte game, </a:t>
-            </a:r>
-            <a:r>
-              <a:rPr lang="nl-NL" dirty="0" err="1"/>
-              <a:t>ookal</a:t>
-            </a:r>
-            <a:r>
-              <a:rPr lang="nl-NL" dirty="0"/>
-              <a:t> is het maar een klein stukje. </a:t>
-            </a:r>
-          </a:p>
-          <a:p>
             <a:endParaRPr lang="nl-NL" dirty="0"/>
-          </a:p>
-          <a:p>
-            <a:r>
-              <a:rPr lang="nl-NL" dirty="0"/>
-              <a:t>Nu alles komt met zijn nadelen. De dingen waar ik tegenop kijk is het werken in een nieuwe omgeving, alhoewel dit zeer vlot gaat aangezien ik al enkele werknemers een langere periode ken. </a:t>
-            </a:r>
-            <a:r>
-              <a:rPr lang="nl-NL" dirty="0" err="1"/>
-              <a:t>Contentreren</a:t>
-            </a:r>
-            <a:r>
-              <a:rPr lang="nl-NL" dirty="0"/>
-              <a:t> op mijn werk, in een nieuwe omgeving is altijd even aanpassen. Verder krijg ik rap stress, het project waar ik ga aan meewerken is een groot project, waar verschillende mensen aan meewerken. Dit zal op verschillende momenten voor stress zorgen. Het is dan aan mij om te zien waar ik deze stress in om zet. </a:t>
-            </a:r>
-          </a:p>
-          <a:p>
-            <a:r>
-              <a:rPr lang="nl-NL" dirty="0"/>
-              <a:t>Het leren van nieuwe code doe je met vallen en opstaan. Dit zal nu ook het geval zijn. Ik zal vaak tegen de lamp lopen, en denken dat ik niet meer verder kan. Soms zal dit voor een langere periode zijn, maar ik zal er altijd veel uit leren. En als laatst heb ik bang om hulp te vragen in een bedrijf. Op school is dit niet zo, maar in een bedrijf heb ik sneller de indruk dat ik als “dom” gezien zou worden als ik te veel vragen zou stellen. Het is me op de stageplek al duidelijk gemaakt dat ik 1000000 vragen mag stellen, dus deze verantwoordelijkheid zal bij mij liggen.</a:t>
-            </a:r>
-          </a:p>
-          <a:p>
-            <a:endParaRPr lang="nl-NL" dirty="0"/>
-          </a:p>
-          <a:p>
-            <a:r>
-              <a:rPr lang="nl-NL" dirty="0"/>
-              <a:t>Ik kijk niet op naar de stage zelf, uit ervaring weet ik dat dit me beter bevalt dan lessen op school, en natuurlijk zal ik erg veel bijleren.</a:t>
-            </a:r>
           </a:p>
         </p:txBody>
       </p:sp>
@@ -1183,7 +1065,7 @@
             <a:fld id="{8E36636D-D922-432D-A958-524484B5923D}" type="datetimeFigureOut">
               <a:rPr lang="en-US" dirty="0"/>
               <a:pPr/>
-              <a:t>11/19/2021</a:t>
+              <a:t>3/13/2022</a:t>
             </a:fld>
             <a:endParaRPr lang="en-US" dirty="0"/>
           </a:p>
@@ -1482,7 +1364,7 @@
           <a:p>
             <a:fld id="{48A87A34-81AB-432B-8DAE-1953F412C126}" type="datetimeFigureOut">
               <a:rPr lang="en-US" dirty="0"/>
-              <a:t>11/19/2021</a:t>
+              <a:t>3/13/2022</a:t>
             </a:fld>
             <a:endParaRPr lang="en-US" dirty="0"/>
           </a:p>
@@ -1674,7 +1556,7 @@
           <a:p>
             <a:fld id="{48A87A34-81AB-432B-8DAE-1953F412C126}" type="datetimeFigureOut">
               <a:rPr lang="en-US" dirty="0"/>
-              <a:t>11/19/2021</a:t>
+              <a:t>3/13/2022</a:t>
             </a:fld>
             <a:endParaRPr lang="en-US" dirty="0"/>
           </a:p>
@@ -1935,7 +1817,7 @@
           <a:p>
             <a:fld id="{48A87A34-81AB-432B-8DAE-1953F412C126}" type="datetimeFigureOut">
               <a:rPr lang="en-US" dirty="0"/>
-              <a:t>11/19/2021</a:t>
+              <a:t>3/13/2022</a:t>
             </a:fld>
             <a:endParaRPr lang="en-US" dirty="0"/>
           </a:p>
@@ -2359,7 +2241,7 @@
           <a:p>
             <a:fld id="{48A87A34-81AB-432B-8DAE-1953F412C126}" type="datetimeFigureOut">
               <a:rPr lang="en-US" dirty="0"/>
-              <a:t>11/19/2021</a:t>
+              <a:t>3/13/2022</a:t>
             </a:fld>
             <a:endParaRPr lang="en-US" dirty="0"/>
           </a:p>
@@ -2896,7 +2778,7 @@
           <a:p>
             <a:fld id="{48A87A34-81AB-432B-8DAE-1953F412C126}" type="datetimeFigureOut">
               <a:rPr lang="en-US" dirty="0"/>
-              <a:t>11/19/2021</a:t>
+              <a:t>3/13/2022</a:t>
             </a:fld>
             <a:endParaRPr lang="en-US" dirty="0"/>
           </a:p>
@@ -3760,7 +3642,7 @@
           <a:p>
             <a:fld id="{48A87A34-81AB-432B-8DAE-1953F412C126}" type="datetimeFigureOut">
               <a:rPr lang="en-US" dirty="0"/>
-              <a:t>11/19/2021</a:t>
+              <a:t>3/13/2022</a:t>
             </a:fld>
             <a:endParaRPr lang="en-US" dirty="0"/>
           </a:p>
@@ -3931,7 +3813,7 @@
             <a:fld id="{8E36636D-D922-432D-A958-524484B5923D}" type="datetimeFigureOut">
               <a:rPr lang="en-US" dirty="0"/>
               <a:pPr/>
-              <a:t>11/19/2021</a:t>
+              <a:t>3/13/2022</a:t>
             </a:fld>
             <a:endParaRPr lang="en-US" dirty="0"/>
           </a:p>
@@ -4117,7 +3999,7 @@
             <a:fld id="{8E36636D-D922-432D-A958-524484B5923D}" type="datetimeFigureOut">
               <a:rPr lang="en-US" dirty="0"/>
               <a:pPr/>
-              <a:t>11/19/2021</a:t>
+              <a:t>3/13/2022</a:t>
             </a:fld>
             <a:endParaRPr lang="en-US" dirty="0"/>
           </a:p>
@@ -5021,7 +4903,7 @@
             <a:fld id="{8E36636D-D922-432D-A958-524484B5923D}" type="datetimeFigureOut">
               <a:rPr lang="en-US" dirty="0"/>
               <a:pPr/>
-              <a:t>11/19/2021</a:t>
+              <a:t>3/13/2022</a:t>
             </a:fld>
             <a:endParaRPr lang="en-US" dirty="0"/>
           </a:p>
@@ -8930,7 +8812,7 @@
             <a:fld id="{8E36636D-D922-432D-A958-524484B5923D}" type="datetimeFigureOut">
               <a:rPr lang="en-US" dirty="0"/>
               <a:pPr/>
-              <a:t>11/19/2021</a:t>
+              <a:t>3/13/2022</a:t>
             </a:fld>
             <a:endParaRPr lang="en-US" dirty="0"/>
           </a:p>
@@ -9168,7 +9050,7 @@
             <a:fld id="{8E36636D-D922-432D-A958-524484B5923D}" type="datetimeFigureOut">
               <a:rPr lang="en-US" dirty="0"/>
               <a:pPr/>
-              <a:t>11/19/2021</a:t>
+              <a:t>3/13/2022</a:t>
             </a:fld>
             <a:endParaRPr lang="en-US" dirty="0"/>
           </a:p>
@@ -9636,7 +9518,7 @@
             <a:fld id="{8E36636D-D922-432D-A958-524484B5923D}" type="datetimeFigureOut">
               <a:rPr lang="en-US" dirty="0"/>
               <a:pPr/>
-              <a:t>11/19/2021</a:t>
+              <a:t>3/13/2022</a:t>
             </a:fld>
             <a:endParaRPr lang="en-US" dirty="0"/>
           </a:p>
@@ -9756,7 +9638,7 @@
             <a:fld id="{8E36636D-D922-432D-A958-524484B5923D}" type="datetimeFigureOut">
               <a:rPr lang="en-US" dirty="0"/>
               <a:pPr/>
-              <a:t>11/19/2021</a:t>
+              <a:t>3/13/2022</a:t>
             </a:fld>
             <a:endParaRPr lang="en-US" dirty="0"/>
           </a:p>
@@ -9853,7 +9735,7 @@
             <a:fld id="{8E36636D-D922-432D-A958-524484B5923D}" type="datetimeFigureOut">
               <a:rPr lang="en-US" dirty="0"/>
               <a:pPr/>
-              <a:t>11/19/2021</a:t>
+              <a:t>3/13/2022</a:t>
             </a:fld>
             <a:endParaRPr lang="en-US" dirty="0"/>
           </a:p>
@@ -10110,7 +9992,7 @@
             <a:fld id="{8E36636D-D922-432D-A958-524484B5923D}" type="datetimeFigureOut">
               <a:rPr lang="en-US" dirty="0"/>
               <a:pPr/>
-              <a:t>11/19/2021</a:t>
+              <a:t>3/13/2022</a:t>
             </a:fld>
             <a:endParaRPr lang="en-US" dirty="0"/>
           </a:p>
@@ -10412,7 +10294,7 @@
             <a:fld id="{8E36636D-D922-432D-A958-524484B5923D}" type="datetimeFigureOut">
               <a:rPr lang="en-US" dirty="0"/>
               <a:pPr/>
-              <a:t>11/19/2021</a:t>
+              <a:t>3/13/2022</a:t>
             </a:fld>
             <a:endParaRPr lang="en-US" dirty="0"/>
           </a:p>
@@ -10648,7 +10530,7 @@
             <a:fld id="{8E36636D-D922-432D-A958-524484B5923D}" type="datetimeFigureOut">
               <a:rPr lang="en-US" dirty="0"/>
               <a:pPr/>
-              <a:t>11/19/2021</a:t>
+              <a:t>3/13/2022</a:t>
             </a:fld>
             <a:endParaRPr lang="en-US" dirty="0"/>
           </a:p>
@@ -12264,10 +12146,10 @@
               <a:buChar char="•"/>
             </a:pPr>
             <a:r>
-              <a:rPr lang="en-US" dirty="0" err="1"/>
+              <a:rPr lang="nl-BE" dirty="0" err="1"/>
               <a:t>Gazzlers</a:t>
             </a:r>
-            <a:endParaRPr lang="en-US" dirty="0"/>
+            <a:endParaRPr lang="nl-BE" dirty="0"/>
           </a:p>
           <a:p>
             <a:pPr marL="342900" indent="-342900">
@@ -12275,68 +12157,8 @@
               <a:buChar char="•"/>
             </a:pPr>
             <a:r>
-              <a:rPr lang="en-US" dirty="0" err="1"/>
-              <a:t>Nog</a:t>
-            </a:r>
-            <a:r>
-              <a:rPr lang="en-US" dirty="0"/>
-              <a:t> </a:t>
-            </a:r>
-            <a:r>
-              <a:rPr lang="en-US" dirty="0" err="1"/>
-              <a:t>niet</a:t>
-            </a:r>
-            <a:r>
-              <a:rPr lang="en-US" dirty="0"/>
-              <a:t> </a:t>
-            </a:r>
-            <a:r>
-              <a:rPr lang="en-US" dirty="0" err="1"/>
-              <a:t>aanwezig</a:t>
-            </a:r>
-            <a:r>
-              <a:rPr lang="en-US" dirty="0"/>
-              <a:t> </a:t>
-            </a:r>
-            <a:r>
-              <a:rPr lang="en-US" dirty="0" err="1"/>
-              <a:t>wegens</a:t>
-            </a:r>
-            <a:r>
-              <a:rPr lang="en-US" dirty="0"/>
-              <a:t> </a:t>
-            </a:r>
-            <a:r>
-              <a:rPr lang="en-US" dirty="0" err="1"/>
-              <a:t>ziekte</a:t>
-            </a:r>
-            <a:r>
-              <a:rPr lang="en-US" dirty="0"/>
-              <a:t>. </a:t>
-            </a:r>
-            <a:r>
-              <a:rPr lang="en-US" dirty="0" err="1"/>
-              <a:t>Geen</a:t>
-            </a:r>
-            <a:r>
-              <a:rPr lang="en-US" dirty="0"/>
-              <a:t> </a:t>
-            </a:r>
-            <a:r>
-              <a:rPr lang="en-US" dirty="0" err="1"/>
-              <a:t>specifieke</a:t>
-            </a:r>
-            <a:r>
-              <a:rPr lang="en-US" dirty="0"/>
-              <a:t> </a:t>
-            </a:r>
-            <a:r>
-              <a:rPr lang="en-US" dirty="0" err="1"/>
-              <a:t>taakbeschrijving</a:t>
-            </a:r>
-            <a:r>
-              <a:rPr lang="en-US" dirty="0"/>
-              <a:t>.</a:t>
+              <a:rPr lang="nl-BE" dirty="0"/>
+              <a:t>Geluiden afspelen op basis van triggers</a:t>
             </a:r>
           </a:p>
           <a:p>
@@ -12345,8 +12167,8 @@
               <a:buChar char="•"/>
             </a:pPr>
             <a:r>
-              <a:rPr lang="en-US" dirty="0"/>
-              <a:t>Enemy AI</a:t>
+              <a:rPr lang="nl-BE" dirty="0"/>
+              <a:t>GUI displayen op basis van triggers</a:t>
             </a:r>
           </a:p>
           <a:p>
@@ -12355,101 +12177,50 @@
               <a:buChar char="•"/>
             </a:pPr>
             <a:r>
-              <a:rPr lang="en-US" dirty="0" err="1"/>
-              <a:t>Gedragingen</a:t>
-            </a:r>
-            <a:r>
-              <a:rPr lang="en-US" dirty="0"/>
-              <a:t> van de </a:t>
-            </a:r>
-            <a:r>
-              <a:rPr lang="en-US" dirty="0" err="1"/>
-              <a:t>vijanden</a:t>
-            </a:r>
-            <a:r>
-              <a:rPr lang="en-US" dirty="0"/>
-              <a:t>. </a:t>
-            </a:r>
-          </a:p>
-          <a:p>
-            <a:pPr marL="342900" indent="-342900">
-              <a:buFont typeface="Wingdings 2" charset="2"/>
-              <a:buChar char="•"/>
-            </a:pPr>
-            <a:r>
-              <a:rPr lang="en-US" dirty="0" err="1"/>
-              <a:t>Geen</a:t>
-            </a:r>
-            <a:r>
-              <a:rPr lang="en-US" dirty="0"/>
-              <a:t> </a:t>
-            </a:r>
-            <a:r>
-              <a:rPr lang="en-US" dirty="0" err="1"/>
-              <a:t>gewone</a:t>
-            </a:r>
-            <a:r>
-              <a:rPr lang="en-US" dirty="0"/>
-              <a:t> basic “</a:t>
-            </a:r>
-            <a:r>
-              <a:rPr lang="en-US" dirty="0" err="1"/>
-              <a:t>Rijd</a:t>
-            </a:r>
-            <a:r>
-              <a:rPr lang="en-US" dirty="0"/>
-              <a:t> </a:t>
-            </a:r>
-            <a:r>
-              <a:rPr lang="en-US" dirty="0" err="1"/>
-              <a:t>en</a:t>
-            </a:r>
-            <a:r>
-              <a:rPr lang="en-US" dirty="0"/>
-              <a:t> </a:t>
-            </a:r>
-            <a:r>
-              <a:rPr lang="en-US" dirty="0" err="1"/>
-              <a:t>schiet</a:t>
-            </a:r>
-            <a:r>
-              <a:rPr lang="en-US" dirty="0"/>
-              <a:t>”, maar </a:t>
-            </a:r>
-            <a:r>
-              <a:rPr lang="en-US" dirty="0" err="1"/>
-              <a:t>een</a:t>
-            </a:r>
-            <a:r>
-              <a:rPr lang="en-US" dirty="0"/>
-              <a:t> </a:t>
-            </a:r>
-            <a:r>
-              <a:rPr lang="en-US" dirty="0" err="1"/>
-              <a:t>slimme</a:t>
-            </a:r>
-            <a:r>
-              <a:rPr lang="en-US" dirty="0"/>
-              <a:t> </a:t>
-            </a:r>
-            <a:r>
-              <a:rPr lang="en-US" dirty="0" err="1"/>
-              <a:t>vijand</a:t>
-            </a:r>
-            <a:r>
-              <a:rPr lang="en-US" dirty="0"/>
-              <a:t>.</a:t>
-            </a:r>
-          </a:p>
-          <a:p>
-            <a:pPr marL="342900" indent="-342900">
-              <a:buFont typeface="Wingdings 2" charset="2"/>
-              <a:buChar char="•"/>
-            </a:pPr>
-            <a:r>
-              <a:rPr lang="en-US" dirty="0"/>
-              <a:t>MMO Mirror networking</a:t>
-            </a:r>
+              <a:rPr lang="nl-BE" dirty="0"/>
+              <a:t>Apart extra level</a:t>
+            </a:r>
+          </a:p>
+          <a:p>
+            <a:r>
+              <a:rPr lang="nl-BE" dirty="0"/>
+              <a:t>	</a:t>
+            </a:r>
+            <a:r>
+              <a:rPr lang="nl-BE" dirty="0">
+                <a:sym typeface="Wingdings" panose="05000000000000000000" pitchFamily="2" charset="2"/>
+              </a:rPr>
+              <a:t> </a:t>
+            </a:r>
+            <a:r>
+              <a:rPr lang="nl-BE" dirty="0" err="1">
+                <a:sym typeface="Wingdings" panose="05000000000000000000" pitchFamily="2" charset="2"/>
+              </a:rPr>
+              <a:t>Gazzlers</a:t>
+            </a:r>
+            <a:r>
+              <a:rPr lang="nl-BE" dirty="0">
+                <a:sym typeface="Wingdings" panose="05000000000000000000" pitchFamily="2" charset="2"/>
+              </a:rPr>
+              <a:t> neer schieten binnen een bepaalde tijd</a:t>
+            </a:r>
+          </a:p>
+          <a:p>
+            <a:r>
+              <a:rPr lang="nl-BE" dirty="0">
+                <a:sym typeface="Wingdings" panose="05000000000000000000" pitchFamily="2" charset="2"/>
+              </a:rPr>
+              <a:t>	 Extra punten verzamelen</a:t>
+            </a:r>
+          </a:p>
+          <a:p>
+            <a:r>
+              <a:rPr lang="nl-BE" dirty="0">
+                <a:sym typeface="Wingdings" panose="05000000000000000000" pitchFamily="2" charset="2"/>
+              </a:rPr>
+              <a:t>	 Doel: Upgrades </a:t>
+            </a:r>
+            <a:endParaRPr lang="nl-BE" dirty="0"/>
           </a:p>
         </p:txBody>
       </p:sp>
@@ -12828,12 +12599,6 @@
             <a:r>
               <a:rPr lang="nl-NL" dirty="0"/>
               <a:t>VR – Development </a:t>
-            </a:r>
-          </a:p>
-          <a:p>
-            <a:r>
-              <a:rPr lang="nl-NL" dirty="0"/>
-              <a:t>AI schrijven</a:t>
             </a:r>
           </a:p>
           <a:p>
@@ -13455,15 +13220,6 @@
 </file>
 
 <file path=customXml/item2.xml><?xml version="1.0" encoding="utf-8"?>
-<?mso-contentType ?>
-<FormTemplates xmlns="http://schemas.microsoft.com/sharepoint/v3/contenttype/forms">
-  <Display>DocumentLibraryForm</Display>
-  <Edit>DocumentLibraryForm</Edit>
-  <New>DocumentLibraryForm</New>
-</FormTemplates>
-</file>
-
-<file path=customXml/item3.xml><?xml version="1.0" encoding="utf-8"?>
 <ct:contentTypeSchema xmlns:ct="http://schemas.microsoft.com/office/2006/metadata/contentType" xmlns:ma="http://schemas.microsoft.com/office/2006/metadata/properties/metaAttributes" ct:_="" ma:_="" ma:contentTypeName="Document" ma:contentTypeID="0x0101009ED89C65E156434C8716F557DC308AC8" ma:contentTypeVersion="2" ma:contentTypeDescription="Een nieuw document maken." ma:contentTypeScope="" ma:versionID="7eedbac24887af1e8b5b4d5513bd57cf">
   <xsd:schema xmlns:xsd="http://www.w3.org/2001/XMLSchema" xmlns:xs="http://www.w3.org/2001/XMLSchema" xmlns:p="http://schemas.microsoft.com/office/2006/metadata/properties" xmlns:ns2="5f2eb6a8-46cc-4e3d-b11a-2f4d53b99efa" targetNamespace="http://schemas.microsoft.com/office/2006/metadata/properties" ma:root="true" ma:fieldsID="ca7194cc5b73570203188f5f2a190b3c" ns2:_="">
     <xsd:import namespace="5f2eb6a8-46cc-4e3d-b11a-2f4d53b99efa"/>
@@ -13595,6 +13351,15 @@
 </ct:contentTypeSchema>
 </file>
 
+<file path=customXml/item3.xml><?xml version="1.0" encoding="utf-8"?>
+<?mso-contentType ?>
+<FormTemplates xmlns="http://schemas.microsoft.com/sharepoint/v3/contenttype/forms">
+  <Display>DocumentLibraryForm</Display>
+  <Edit>DocumentLibraryForm</Edit>
+  <New>DocumentLibraryForm</New>
+</FormTemplates>
+</file>
+
 <file path=customXml/itemProps1.xml><?xml version="1.0" encoding="utf-8"?>
 <ds:datastoreItem xmlns:ds="http://schemas.openxmlformats.org/officeDocument/2006/customXml" ds:itemID="{0F7ABE28-46F6-4A50-81C2-C4C7EC78C09F}">
   <ds:schemaRefs>
@@ -13612,14 +13377,6 @@
 </file>
 
 <file path=customXml/itemProps2.xml><?xml version="1.0" encoding="utf-8"?>
-<ds:datastoreItem xmlns:ds="http://schemas.openxmlformats.org/officeDocument/2006/customXml" ds:itemID="{9949588B-0D73-4C9A-B084-DF776E9048DC}">
-  <ds:schemaRefs>
-    <ds:schemaRef ds:uri="http://schemas.microsoft.com/sharepoint/v3/contenttype/forms"/>
-  </ds:schemaRefs>
-</ds:datastoreItem>
-</file>
-
-<file path=customXml/itemProps3.xml><?xml version="1.0" encoding="utf-8"?>
 <ds:datastoreItem xmlns:ds="http://schemas.openxmlformats.org/officeDocument/2006/customXml" ds:itemID="{2A32629E-93E9-4241-972A-8D5FB6309C66}">
   <ds:schemaRefs>
     <ds:schemaRef ds:uri="http://schemas.microsoft.com/office/2006/metadata/contentType"/>
@@ -13635,4 +13392,12 @@
     <ds:schemaRef ds:uri="http://schemas.microsoft.com/internal/obd"/>
   </ds:schemaRefs>
 </ds:datastoreItem>
+</file>
+
+<file path=customXml/itemProps3.xml><?xml version="1.0" encoding="utf-8"?>
+<ds:datastoreItem xmlns:ds="http://schemas.openxmlformats.org/officeDocument/2006/customXml" ds:itemID="{9949588B-0D73-4C9A-B084-DF776E9048DC}">
+  <ds:schemaRefs>
+    <ds:schemaRef ds:uri="http://schemas.microsoft.com/sharepoint/v3/contenttype/forms"/>
+  </ds:schemaRefs>
+</ds:datastoreItem>
 </file>
</xml_diff>